<commit_message>
Need to implement for real the message passing. Have general structure
</commit_message>
<xml_diff>
--- a/MRF Learning.pptx
+++ b/MRF Learning.pptx
@@ -264,7 +264,7 @@
           <a:p>
             <a:fld id="{8174CD19-1539-4C4F-BA8F-941F0C8088BF}" type="datetimeFigureOut">
               <a:rPr lang="en-US" smtClean="0"/>
-              <a:t>5/25/2018</a:t>
+              <a:t>6/1/2018</a:t>
             </a:fld>
             <a:endParaRPr lang="en-US"/>
           </a:p>
@@ -462,7 +462,7 @@
           <a:p>
             <a:fld id="{8174CD19-1539-4C4F-BA8F-941F0C8088BF}" type="datetimeFigureOut">
               <a:rPr lang="en-US" smtClean="0"/>
-              <a:t>5/25/2018</a:t>
+              <a:t>6/1/2018</a:t>
             </a:fld>
             <a:endParaRPr lang="en-US"/>
           </a:p>
@@ -670,7 +670,7 @@
           <a:p>
             <a:fld id="{8174CD19-1539-4C4F-BA8F-941F0C8088BF}" type="datetimeFigureOut">
               <a:rPr lang="en-US" smtClean="0"/>
-              <a:t>5/25/2018</a:t>
+              <a:t>6/1/2018</a:t>
             </a:fld>
             <a:endParaRPr lang="en-US"/>
           </a:p>
@@ -868,7 +868,7 @@
           <a:p>
             <a:fld id="{8174CD19-1539-4C4F-BA8F-941F0C8088BF}" type="datetimeFigureOut">
               <a:rPr lang="en-US" smtClean="0"/>
-              <a:t>5/25/2018</a:t>
+              <a:t>6/1/2018</a:t>
             </a:fld>
             <a:endParaRPr lang="en-US"/>
           </a:p>
@@ -1143,7 +1143,7 @@
           <a:p>
             <a:fld id="{8174CD19-1539-4C4F-BA8F-941F0C8088BF}" type="datetimeFigureOut">
               <a:rPr lang="en-US" smtClean="0"/>
-              <a:t>5/25/2018</a:t>
+              <a:t>6/1/2018</a:t>
             </a:fld>
             <a:endParaRPr lang="en-US"/>
           </a:p>
@@ -1408,7 +1408,7 @@
           <a:p>
             <a:fld id="{8174CD19-1539-4C4F-BA8F-941F0C8088BF}" type="datetimeFigureOut">
               <a:rPr lang="en-US" smtClean="0"/>
-              <a:t>5/25/2018</a:t>
+              <a:t>6/1/2018</a:t>
             </a:fld>
             <a:endParaRPr lang="en-US"/>
           </a:p>
@@ -1820,7 +1820,7 @@
           <a:p>
             <a:fld id="{8174CD19-1539-4C4F-BA8F-941F0C8088BF}" type="datetimeFigureOut">
               <a:rPr lang="en-US" smtClean="0"/>
-              <a:t>5/25/2018</a:t>
+              <a:t>6/1/2018</a:t>
             </a:fld>
             <a:endParaRPr lang="en-US"/>
           </a:p>
@@ -1961,7 +1961,7 @@
           <a:p>
             <a:fld id="{8174CD19-1539-4C4F-BA8F-941F0C8088BF}" type="datetimeFigureOut">
               <a:rPr lang="en-US" smtClean="0"/>
-              <a:t>5/25/2018</a:t>
+              <a:t>6/1/2018</a:t>
             </a:fld>
             <a:endParaRPr lang="en-US"/>
           </a:p>
@@ -2074,7 +2074,7 @@
           <a:p>
             <a:fld id="{8174CD19-1539-4C4F-BA8F-941F0C8088BF}" type="datetimeFigureOut">
               <a:rPr lang="en-US" smtClean="0"/>
-              <a:t>5/25/2018</a:t>
+              <a:t>6/1/2018</a:t>
             </a:fld>
             <a:endParaRPr lang="en-US"/>
           </a:p>
@@ -2385,7 +2385,7 @@
           <a:p>
             <a:fld id="{8174CD19-1539-4C4F-BA8F-941F0C8088BF}" type="datetimeFigureOut">
               <a:rPr lang="en-US" smtClean="0"/>
-              <a:t>5/25/2018</a:t>
+              <a:t>6/1/2018</a:t>
             </a:fld>
             <a:endParaRPr lang="en-US"/>
           </a:p>
@@ -2673,7 +2673,7 @@
           <a:p>
             <a:fld id="{8174CD19-1539-4C4F-BA8F-941F0C8088BF}" type="datetimeFigureOut">
               <a:rPr lang="en-US" smtClean="0"/>
-              <a:t>5/25/2018</a:t>
+              <a:t>6/1/2018</a:t>
             </a:fld>
             <a:endParaRPr lang="en-US"/>
           </a:p>
@@ -2914,7 +2914,7 @@
           <a:p>
             <a:fld id="{8174CD19-1539-4C4F-BA8F-941F0C8088BF}" type="datetimeFigureOut">
               <a:rPr lang="en-US" smtClean="0"/>
-              <a:t>5/25/2018</a:t>
+              <a:t>6/1/2018</a:t>
             </a:fld>
             <a:endParaRPr lang="en-US"/>
           </a:p>
@@ -4287,8 +4287,8 @@
           </a:p>
         </p:txBody>
       </p:sp>
-      <mc:AlternateContent xmlns:mc="http://schemas.openxmlformats.org/markup-compatibility/2006">
-        <mc:Choice xmlns:a14="http://schemas.microsoft.com/office/drawing/2010/main" Requires="a14">
+      <mc:AlternateContent xmlns:mc="http://schemas.openxmlformats.org/markup-compatibility/2006" xmlns:a14="http://schemas.microsoft.com/office/drawing/2010/main">
+        <mc:Choice Requires="a14">
           <p:sp>
             <p:nvSpPr>
               <p:cNvPr id="3" name="Content Placeholder 2">
@@ -7544,7 +7544,7 @@
             </p:txBody>
           </p:sp>
         </mc:Choice>
-        <mc:Fallback>
+        <mc:Fallback xmlns="">
           <p:sp>
             <p:nvSpPr>
               <p:cNvPr id="3" name="Content Placeholder 2">
@@ -7893,42 +7893,6 @@
           <a:xfrm>
             <a:off x="10979915" y="2821799"/>
             <a:ext cx="975715" cy="793987"/>
-          </a:xfrm>
-          <a:prstGeom prst="line">
-            <a:avLst/>
-          </a:prstGeom>
-        </p:spPr>
-        <p:style>
-          <a:lnRef idx="1">
-            <a:schemeClr val="accent1"/>
-          </a:lnRef>
-          <a:fillRef idx="0">
-            <a:schemeClr val="accent1"/>
-          </a:fillRef>
-          <a:effectRef idx="0">
-            <a:schemeClr val="accent1"/>
-          </a:effectRef>
-          <a:fontRef idx="minor">
-            <a:schemeClr val="tx1"/>
-          </a:fontRef>
-        </p:style>
-      </p:cxnSp>
-      <p:cxnSp>
-        <p:nvCxnSpPr>
-          <p:cNvPr id="14" name="Straight Connector 13">
-            <a:extLst>
-              <a:ext uri="{FF2B5EF4-FFF2-40B4-BE49-F238E27FC236}">
-                <a16:creationId xmlns:a16="http://schemas.microsoft.com/office/drawing/2014/main" id="{52D01C96-3317-403C-923B-D92174DDD0F1}"/>
-              </a:ext>
-            </a:extLst>
-          </p:cNvPr>
-          <p:cNvCxnSpPr/>
-          <p:nvPr/>
-        </p:nvCxnSpPr>
-        <p:spPr>
-          <a:xfrm flipH="1">
-            <a:off x="9794248" y="4129813"/>
-            <a:ext cx="1457325" cy="905009"/>
           </a:xfrm>
           <a:prstGeom prst="line">
             <a:avLst/>

</xml_diff>